<commit_message>
update data and useSetLanguageFromURL.ts hook
</commit_message>
<xml_diff>
--- a/public/projects/13-water-treatment-plant/13-water-treatment-plant.pptx
+++ b/public/projects/13-water-treatment-plant/13-water-treatment-plant.pptx
@@ -7,7 +7,7 @@
   <p:sldIdLst>
     <p:sldId id="259" r:id="rId2"/>
     <p:sldId id="256" r:id="rId3"/>
-    <p:sldId id="257" r:id="rId4"/>
+    <p:sldId id="260" r:id="rId4"/>
     <p:sldId id="258" r:id="rId5"/>
   </p:sldIdLst>
   <p:sldSz cx="18288000" cy="10287000"/>
@@ -323,7 +323,7 @@
             <a:fld id="{1D8BD707-D9CF-40AE-B4C6-C98DA3205C09}" type="datetimeFigureOut">
               <a:rPr lang="en-US" smtClean="0"/>
               <a:pPr/>
-              <a:t>11/7/2024</a:t>
+              <a:t>11/11/2024</a:t>
             </a:fld>
             <a:endParaRPr lang="en-US"/>
           </a:p>
@@ -488,7 +488,7 @@
             <a:fld id="{1D8BD707-D9CF-40AE-B4C6-C98DA3205C09}" type="datetimeFigureOut">
               <a:rPr lang="en-US" smtClean="0"/>
               <a:pPr/>
-              <a:t>11/7/2024</a:t>
+              <a:t>11/11/2024</a:t>
             </a:fld>
             <a:endParaRPr lang="en-US"/>
           </a:p>
@@ -663,7 +663,7 @@
             <a:fld id="{1D8BD707-D9CF-40AE-B4C6-C98DA3205C09}" type="datetimeFigureOut">
               <a:rPr lang="en-US" smtClean="0"/>
               <a:pPr/>
-              <a:t>11/7/2024</a:t>
+              <a:t>11/11/2024</a:t>
             </a:fld>
             <a:endParaRPr lang="en-US"/>
           </a:p>
@@ -828,7 +828,7 @@
             <a:fld id="{1D8BD707-D9CF-40AE-B4C6-C98DA3205C09}" type="datetimeFigureOut">
               <a:rPr lang="en-US" smtClean="0"/>
               <a:pPr/>
-              <a:t>11/7/2024</a:t>
+              <a:t>11/11/2024</a:t>
             </a:fld>
             <a:endParaRPr lang="en-US"/>
           </a:p>
@@ -1070,7 +1070,7 @@
             <a:fld id="{1D8BD707-D9CF-40AE-B4C6-C98DA3205C09}" type="datetimeFigureOut">
               <a:rPr lang="en-US" smtClean="0"/>
               <a:pPr/>
-              <a:t>11/7/2024</a:t>
+              <a:t>11/11/2024</a:t>
             </a:fld>
             <a:endParaRPr lang="en-US"/>
           </a:p>
@@ -1352,7 +1352,7 @@
             <a:fld id="{1D8BD707-D9CF-40AE-B4C6-C98DA3205C09}" type="datetimeFigureOut">
               <a:rPr lang="en-US" smtClean="0"/>
               <a:pPr/>
-              <a:t>11/7/2024</a:t>
+              <a:t>11/11/2024</a:t>
             </a:fld>
             <a:endParaRPr lang="en-US"/>
           </a:p>
@@ -1768,7 +1768,7 @@
             <a:fld id="{1D8BD707-D9CF-40AE-B4C6-C98DA3205C09}" type="datetimeFigureOut">
               <a:rPr lang="en-US" smtClean="0"/>
               <a:pPr/>
-              <a:t>11/7/2024</a:t>
+              <a:t>11/11/2024</a:t>
             </a:fld>
             <a:endParaRPr lang="en-US"/>
           </a:p>
@@ -1882,7 +1882,7 @@
             <a:fld id="{1D8BD707-D9CF-40AE-B4C6-C98DA3205C09}" type="datetimeFigureOut">
               <a:rPr lang="en-US" smtClean="0"/>
               <a:pPr/>
-              <a:t>11/7/2024</a:t>
+              <a:t>11/11/2024</a:t>
             </a:fld>
             <a:endParaRPr lang="en-US"/>
           </a:p>
@@ -1974,7 +1974,7 @@
             <a:fld id="{1D8BD707-D9CF-40AE-B4C6-C98DA3205C09}" type="datetimeFigureOut">
               <a:rPr lang="en-US" smtClean="0"/>
               <a:pPr/>
-              <a:t>11/7/2024</a:t>
+              <a:t>11/11/2024</a:t>
             </a:fld>
             <a:endParaRPr lang="en-US"/>
           </a:p>
@@ -2246,7 +2246,7 @@
             <a:fld id="{1D8BD707-D9CF-40AE-B4C6-C98DA3205C09}" type="datetimeFigureOut">
               <a:rPr lang="en-US" smtClean="0"/>
               <a:pPr/>
-              <a:t>11/7/2024</a:t>
+              <a:t>11/11/2024</a:t>
             </a:fld>
             <a:endParaRPr lang="en-US"/>
           </a:p>
@@ -2495,7 +2495,7 @@
             <a:fld id="{1D8BD707-D9CF-40AE-B4C6-C98DA3205C09}" type="datetimeFigureOut">
               <a:rPr lang="en-US" smtClean="0"/>
               <a:pPr/>
-              <a:t>11/7/2024</a:t>
+              <a:t>11/11/2024</a:t>
             </a:fld>
             <a:endParaRPr lang="en-US"/>
           </a:p>
@@ -2703,7 +2703,7 @@
             <a:fld id="{1D8BD707-D9CF-40AE-B4C6-C98DA3205C09}" type="datetimeFigureOut">
               <a:rPr lang="en-US" smtClean="0"/>
               <a:pPr/>
-              <a:t>11/7/2024</a:t>
+              <a:t>11/11/2024</a:t>
             </a:fld>
             <a:endParaRPr lang="en-US"/>
           </a:p>
@@ -5531,7 +5531,7 @@
         </p:nvSpPr>
         <p:spPr>
           <a:xfrm>
-            <a:off x="1556697" y="4077787"/>
+            <a:off x="1524905" y="4286022"/>
             <a:ext cx="528005" cy="542936"/>
           </a:xfrm>
           <a:custGeom>
@@ -5549,10 +5549,10 @@
                   <a:pt x="528005" y="0"/>
                 </a:lnTo>
                 <a:lnTo>
-                  <a:pt x="528005" y="542936"/>
-                </a:lnTo>
-                <a:lnTo>
-                  <a:pt x="0" y="542936"/>
+                  <a:pt x="528005" y="542935"/>
+                </a:lnTo>
+                <a:lnTo>
+                  <a:pt x="0" y="542935"/>
                 </a:lnTo>
                 <a:lnTo>
                   <a:pt x="0" y="0"/>
@@ -5635,7 +5635,7 @@
         </p:nvSpPr>
         <p:spPr>
           <a:xfrm>
-            <a:off x="1513239" y="6187439"/>
+            <a:off x="1483071" y="6456265"/>
             <a:ext cx="551337" cy="541689"/>
           </a:xfrm>
           <a:custGeom>
@@ -5687,7 +5687,7 @@
         </p:nvSpPr>
         <p:spPr>
           <a:xfrm>
-            <a:off x="1556697" y="5077748"/>
+            <a:off x="1556697" y="5331664"/>
             <a:ext cx="528005" cy="528666"/>
           </a:xfrm>
           <a:custGeom>
@@ -5739,8 +5739,8 @@
         </p:nvSpPr>
         <p:spPr>
           <a:xfrm>
-            <a:off x="2475424" y="4082686"/>
-            <a:ext cx="6108009" cy="4375683"/>
+            <a:off x="2475424" y="4444636"/>
+            <a:ext cx="6108009" cy="4013733"/>
           </a:xfrm>
           <a:prstGeom prst="rect">
             <a:avLst/>
@@ -5920,7 +5920,7 @@
                 <a:cs typeface="Helios Extended"/>
                 <a:sym typeface="Helios Extended"/>
               </a:rPr>
-              <a:t>electric capacity of SPP: 1 MW, 300 kW</a:t>
+              <a:t>electric capacity of SPP: 1 MW</a:t>
             </a:r>
           </a:p>
           <a:p>
@@ -6195,8 +6195,8 @@
         </p:nvSpPr>
         <p:spPr>
           <a:xfrm>
-            <a:off x="1556697" y="7386353"/>
-            <a:ext cx="464421" cy="460357"/>
+            <a:off x="1524905" y="7564069"/>
+            <a:ext cx="509503" cy="505045"/>
           </a:xfrm>
           <a:custGeom>
             <a:avLst/>
@@ -6205,18 +6205,18 @@
             <a:cxnLst/>
             <a:rect l="l" t="t" r="r" b="b"/>
             <a:pathLst>
-              <a:path w="464421" h="460357">
+              <a:path w="509503" h="505045">
                 <a:moveTo>
                   <a:pt x="0" y="0"/>
                 </a:moveTo>
                 <a:lnTo>
-                  <a:pt x="464421" y="0"/>
-                </a:lnTo>
-                <a:lnTo>
-                  <a:pt x="464421" y="460357"/>
-                </a:lnTo>
-                <a:lnTo>
-                  <a:pt x="0" y="460357"/>
+                  <a:pt x="509503" y="0"/>
+                </a:lnTo>
+                <a:lnTo>
+                  <a:pt x="509503" y="505045"/>
+                </a:lnTo>
+                <a:lnTo>
+                  <a:pt x="0" y="505045"/>
                 </a:lnTo>
                 <a:lnTo>
                   <a:pt x="0" y="0"/>

</xml_diff>